<commit_message>
Versión final Presentación Milestone 2
</commit_message>
<xml_diff>
--- a/Recuento Agora Us.pptx
+++ b/Recuento Agora Us.pptx
@@ -24,6 +24,7 @@
     <p:sldId id="274" r:id="rId18"/>
     <p:sldId id="263" r:id="rId19"/>
     <p:sldId id="277" r:id="rId20"/>
+    <p:sldId id="278" r:id="rId21"/>
   </p:sldIdLst>
   <p:sldSz cx="12192000" cy="6858000"/>
   <p:notesSz cx="6858000" cy="9144000"/>
@@ -146,6 +147,7 @@
             <p14:sldId id="274"/>
             <p14:sldId id="263"/>
             <p14:sldId id="277"/>
+            <p14:sldId id="278"/>
           </p14:sldIdLst>
         </p14:section>
       </p14:sectionLst>
@@ -5553,7 +5555,7 @@
           <a:p>
             <a:fld id="{51FF2715-1D21-4F73-A62D-A6137D589553}" type="datetimeFigureOut">
               <a:rPr lang="es-ES" smtClean="0"/>
-              <a:t>13/12/2017</a:t>
+              <a:t>14/12/2017</a:t>
             </a:fld>
             <a:endParaRPr lang="es-ES"/>
           </a:p>
@@ -5723,7 +5725,7 @@
           <a:p>
             <a:fld id="{51FF2715-1D21-4F73-A62D-A6137D589553}" type="datetimeFigureOut">
               <a:rPr lang="es-ES" smtClean="0"/>
-              <a:t>13/12/2017</a:t>
+              <a:t>14/12/2017</a:t>
             </a:fld>
             <a:endParaRPr lang="es-ES"/>
           </a:p>
@@ -5903,7 +5905,7 @@
           <a:p>
             <a:fld id="{51FF2715-1D21-4F73-A62D-A6137D589553}" type="datetimeFigureOut">
               <a:rPr lang="es-ES" smtClean="0"/>
-              <a:t>13/12/2017</a:t>
+              <a:t>14/12/2017</a:t>
             </a:fld>
             <a:endParaRPr lang="es-ES"/>
           </a:p>
@@ -6073,7 +6075,7 @@
           <a:p>
             <a:fld id="{51FF2715-1D21-4F73-A62D-A6137D589553}" type="datetimeFigureOut">
               <a:rPr lang="es-ES" smtClean="0"/>
-              <a:t>13/12/2017</a:t>
+              <a:t>14/12/2017</a:t>
             </a:fld>
             <a:endParaRPr lang="es-ES"/>
           </a:p>
@@ -6319,7 +6321,7 @@
           <a:p>
             <a:fld id="{51FF2715-1D21-4F73-A62D-A6137D589553}" type="datetimeFigureOut">
               <a:rPr lang="es-ES" smtClean="0"/>
-              <a:t>13/12/2017</a:t>
+              <a:t>14/12/2017</a:t>
             </a:fld>
             <a:endParaRPr lang="es-ES"/>
           </a:p>
@@ -6551,7 +6553,7 @@
           <a:p>
             <a:fld id="{51FF2715-1D21-4F73-A62D-A6137D589553}" type="datetimeFigureOut">
               <a:rPr lang="es-ES" smtClean="0"/>
-              <a:t>13/12/2017</a:t>
+              <a:t>14/12/2017</a:t>
             </a:fld>
             <a:endParaRPr lang="es-ES"/>
           </a:p>
@@ -6918,7 +6920,7 @@
           <a:p>
             <a:fld id="{51FF2715-1D21-4F73-A62D-A6137D589553}" type="datetimeFigureOut">
               <a:rPr lang="es-ES" smtClean="0"/>
-              <a:t>13/12/2017</a:t>
+              <a:t>14/12/2017</a:t>
             </a:fld>
             <a:endParaRPr lang="es-ES"/>
           </a:p>
@@ -7036,7 +7038,7 @@
           <a:p>
             <a:fld id="{51FF2715-1D21-4F73-A62D-A6137D589553}" type="datetimeFigureOut">
               <a:rPr lang="es-ES" smtClean="0"/>
-              <a:t>13/12/2017</a:t>
+              <a:t>14/12/2017</a:t>
             </a:fld>
             <a:endParaRPr lang="es-ES"/>
           </a:p>
@@ -7131,7 +7133,7 @@
           <a:p>
             <a:fld id="{51FF2715-1D21-4F73-A62D-A6137D589553}" type="datetimeFigureOut">
               <a:rPr lang="es-ES" smtClean="0"/>
-              <a:t>13/12/2017</a:t>
+              <a:t>14/12/2017</a:t>
             </a:fld>
             <a:endParaRPr lang="es-ES"/>
           </a:p>
@@ -7408,7 +7410,7 @@
           <a:p>
             <a:fld id="{51FF2715-1D21-4F73-A62D-A6137D589553}" type="datetimeFigureOut">
               <a:rPr lang="es-ES" smtClean="0"/>
-              <a:t>13/12/2017</a:t>
+              <a:t>14/12/2017</a:t>
             </a:fld>
             <a:endParaRPr lang="es-ES"/>
           </a:p>
@@ -7665,7 +7667,7 @@
           <a:p>
             <a:fld id="{51FF2715-1D21-4F73-A62D-A6137D589553}" type="datetimeFigureOut">
               <a:rPr lang="es-ES" smtClean="0"/>
-              <a:t>13/12/2017</a:t>
+              <a:t>14/12/2017</a:t>
             </a:fld>
             <a:endParaRPr lang="es-ES"/>
           </a:p>
@@ -7878,7 +7880,7 @@
           <a:p>
             <a:fld id="{51FF2715-1D21-4F73-A62D-A6137D589553}" type="datetimeFigureOut">
               <a:rPr lang="es-ES" smtClean="0"/>
-              <a:t>13/12/2017</a:t>
+              <a:t>14/12/2017</a:t>
             </a:fld>
             <a:endParaRPr lang="es-ES"/>
           </a:p>
@@ -8913,7 +8915,17 @@
           <a:lstStyle/>
           <a:p>
             <a:pPr algn="l"/>
-            <a:endParaRPr lang="es-ES"/>
+            <a:r>
+              <a:rPr lang="es-ES" dirty="0"/>
+              <a:t>Francisco Javier </a:t>
+            </a:r>
+          </a:p>
+          <a:p>
+            <a:pPr algn="l"/>
+            <a:r>
+              <a:rPr lang="es-ES"/>
+              <a:t>	Huertas Vera</a:t>
+            </a:r>
           </a:p>
         </p:txBody>
       </p:sp>
@@ -8927,6 +8939,14 @@
   <p:clrMapOvr>
     <a:masterClrMapping/>
   </p:clrMapOvr>
+  <mc:AlternateContent xmlns:mc="http://schemas.openxmlformats.org/markup-compatibility/2006" xmlns:p14="http://schemas.microsoft.com/office/powerpoint/2010/main">
+    <mc:Choice Requires="p14">
+      <p:transition spd="slow" p14:dur="2000" advTm="20000"/>
+    </mc:Choice>
+    <mc:Fallback xmlns="">
+      <p:transition spd="slow" advTm="20000"/>
+    </mc:Fallback>
+  </mc:AlternateContent>
 </p:sld>
 </file>
 
@@ -9021,6 +9041,14 @@
   <p:clrMapOvr>
     <a:masterClrMapping/>
   </p:clrMapOvr>
+  <mc:AlternateContent xmlns:mc="http://schemas.openxmlformats.org/markup-compatibility/2006" xmlns:p14="http://schemas.microsoft.com/office/powerpoint/2010/main">
+    <mc:Choice Requires="p14">
+      <p:transition spd="slow" p14:dur="2000" advTm="20000"/>
+    </mc:Choice>
+    <mc:Fallback xmlns="">
+      <p:transition spd="slow" advTm="20000"/>
+    </mc:Fallback>
+  </mc:AlternateContent>
 </p:sld>
 </file>
 
@@ -9189,6 +9217,14 @@
   <p:clrMapOvr>
     <a:overrideClrMapping bg1="dk1" tx1="lt1" bg2="dk2" tx2="lt2" accent1="accent1" accent2="accent2" accent3="accent3" accent4="accent4" accent5="accent5" accent6="accent6" hlink="hlink" folHlink="folHlink"/>
   </p:clrMapOvr>
+  <mc:AlternateContent xmlns:mc="http://schemas.openxmlformats.org/markup-compatibility/2006" xmlns:p14="http://schemas.microsoft.com/office/powerpoint/2010/main">
+    <mc:Choice Requires="p14">
+      <p:transition spd="slow" p14:dur="2000" advTm="20000"/>
+    </mc:Choice>
+    <mc:Fallback xmlns="">
+      <p:transition spd="slow" advTm="20000"/>
+    </mc:Fallback>
+  </mc:AlternateContent>
 </p:sld>
 </file>
 
@@ -9281,6 +9317,14 @@
   <p:clrMapOvr>
     <a:masterClrMapping/>
   </p:clrMapOvr>
+  <mc:AlternateContent xmlns:mc="http://schemas.openxmlformats.org/markup-compatibility/2006" xmlns:p14="http://schemas.microsoft.com/office/powerpoint/2010/main">
+    <mc:Choice Requires="p14">
+      <p:transition spd="slow" p14:dur="2000" advTm="20000"/>
+    </mc:Choice>
+    <mc:Fallback xmlns="">
+      <p:transition spd="slow" advTm="20000"/>
+    </mc:Fallback>
+  </mc:AlternateContent>
 </p:sld>
 </file>
 
@@ -9371,6 +9415,14 @@
   <p:clrMapOvr>
     <a:masterClrMapping/>
   </p:clrMapOvr>
+  <mc:AlternateContent xmlns:mc="http://schemas.openxmlformats.org/markup-compatibility/2006" xmlns:p14="http://schemas.microsoft.com/office/powerpoint/2010/main">
+    <mc:Choice Requires="p14">
+      <p:transition spd="slow" p14:dur="2000" advTm="20000"/>
+    </mc:Choice>
+    <mc:Fallback xmlns="">
+      <p:transition spd="slow" advTm="20000"/>
+    </mc:Fallback>
+  </mc:AlternateContent>
 </p:sld>
 </file>
 
@@ -9499,6 +9551,14 @@
   <p:clrMapOvr>
     <a:masterClrMapping/>
   </p:clrMapOvr>
+  <mc:AlternateContent xmlns:mc="http://schemas.openxmlformats.org/markup-compatibility/2006" xmlns:p14="http://schemas.microsoft.com/office/powerpoint/2010/main">
+    <mc:Choice Requires="p14">
+      <p:transition spd="slow" p14:dur="2000" advTm="20000"/>
+    </mc:Choice>
+    <mc:Fallback xmlns="">
+      <p:transition spd="slow" advTm="20000"/>
+    </mc:Fallback>
+  </mc:AlternateContent>
 </p:sld>
 </file>
 
@@ -9620,6 +9680,14 @@
   <p:clrMapOvr>
     <a:masterClrMapping/>
   </p:clrMapOvr>
+  <mc:AlternateContent xmlns:mc="http://schemas.openxmlformats.org/markup-compatibility/2006" xmlns:p14="http://schemas.microsoft.com/office/powerpoint/2010/main">
+    <mc:Choice Requires="p14">
+      <p:transition spd="slow" p14:dur="2000" advTm="20000"/>
+    </mc:Choice>
+    <mc:Fallback xmlns="">
+      <p:transition spd="slow" advTm="20000"/>
+    </mc:Fallback>
+  </mc:AlternateContent>
 </p:sld>
 </file>
 
@@ -9746,6 +9814,14 @@
   <p:clrMapOvr>
     <a:masterClrMapping/>
   </p:clrMapOvr>
+  <mc:AlternateContent xmlns:mc="http://schemas.openxmlformats.org/markup-compatibility/2006" xmlns:p14="http://schemas.microsoft.com/office/powerpoint/2010/main">
+    <mc:Choice Requires="p14">
+      <p:transition spd="slow" p14:dur="2000" advTm="20000"/>
+    </mc:Choice>
+    <mc:Fallback xmlns="">
+      <p:transition spd="slow" advTm="20000"/>
+    </mc:Fallback>
+  </mc:AlternateContent>
 </p:sld>
 </file>
 
@@ -9874,6 +9950,14 @@
   <p:clrMapOvr>
     <a:masterClrMapping/>
   </p:clrMapOvr>
+  <mc:AlternateContent xmlns:mc="http://schemas.openxmlformats.org/markup-compatibility/2006" xmlns:p14="http://schemas.microsoft.com/office/powerpoint/2010/main">
+    <mc:Choice Requires="p14">
+      <p:transition spd="slow" p14:dur="2000" advTm="20000"/>
+    </mc:Choice>
+    <mc:Fallback xmlns="">
+      <p:transition spd="slow" advTm="20000"/>
+    </mc:Fallback>
+  </mc:AlternateContent>
 </p:sld>
 </file>
 
@@ -9943,7 +10027,22 @@
           <a:bodyPr/>
           <a:lstStyle/>
           <a:p>
-            <a:endParaRPr lang="es-ES" dirty="0"/>
+            <a:r>
+              <a:rPr lang="es-ES" dirty="0"/>
+              <a:t> Tipos de recuento implementados: recuento de votación de aprobación múltiple y única (elige varios y elige uno)</a:t>
+            </a:r>
+          </a:p>
+          <a:p>
+            <a:r>
+              <a:rPr lang="es-ES" dirty="0"/>
+              <a:t>Tenemos una API REST que aún no está terminada</a:t>
+            </a:r>
+          </a:p>
+          <a:p>
+            <a:r>
+              <a:rPr lang="es-ES" dirty="0"/>
+              <a:t>Tenemos un modelo de datos implementado, pero estamos a la espera de integración.</a:t>
+            </a:r>
           </a:p>
         </p:txBody>
       </p:sp>
@@ -9957,6 +10056,14 @@
   <p:clrMapOvr>
     <a:masterClrMapping/>
   </p:clrMapOvr>
+  <mc:AlternateContent xmlns:mc="http://schemas.openxmlformats.org/markup-compatibility/2006" xmlns:p14="http://schemas.microsoft.com/office/powerpoint/2010/main">
+    <mc:Choice Requires="p14">
+      <p:transition spd="slow" p14:dur="2000" advTm="20000"/>
+    </mc:Choice>
+    <mc:Fallback xmlns="">
+      <p:transition spd="slow" advTm="20000"/>
+    </mc:Fallback>
+  </mc:AlternateContent>
 </p:sld>
 </file>
 
@@ -10049,6 +10156,14 @@
   <p:clrMapOvr>
     <a:masterClrMapping/>
   </p:clrMapOvr>
+  <mc:AlternateContent xmlns:mc="http://schemas.openxmlformats.org/markup-compatibility/2006" xmlns:p14="http://schemas.microsoft.com/office/powerpoint/2010/main">
+    <mc:Choice Requires="p14">
+      <p:transition spd="slow" p14:dur="2000" advTm="20000"/>
+    </mc:Choice>
+    <mc:Fallback xmlns="">
+      <p:transition spd="slow" advTm="20000"/>
+    </mc:Fallback>
+  </mc:AlternateContent>
 </p:sld>
 </file>
 
@@ -10179,6 +10294,97 @@
   <p:clrMapOvr>
     <a:masterClrMapping/>
   </p:clrMapOvr>
+  <mc:AlternateContent xmlns:mc="http://schemas.openxmlformats.org/markup-compatibility/2006" xmlns:p14="http://schemas.microsoft.com/office/powerpoint/2010/main">
+    <mc:Choice Requires="p14">
+      <p:transition spd="slow" p14:dur="2000" advTm="20000"/>
+    </mc:Choice>
+    <mc:Fallback xmlns="">
+      <p:transition spd="slow" advTm="20000"/>
+    </mc:Fallback>
+  </mc:AlternateContent>
+</p:sld>
+</file>
+
+<file path=ppt/slides/slide20.xml><?xml version="1.0" encoding="utf-8"?>
+<p:sld xmlns:a="http://schemas.openxmlformats.org/drawingml/2006/main" xmlns:r="http://schemas.openxmlformats.org/officeDocument/2006/relationships" xmlns:p="http://schemas.openxmlformats.org/presentationml/2006/main">
+  <p:cSld>
+    <p:bg>
+      <p:bgPr>
+        <a:solidFill>
+          <a:schemeClr val="bg1"/>
+        </a:solidFill>
+        <a:effectLst/>
+      </p:bgPr>
+    </p:bg>
+    <p:spTree>
+      <p:nvGrpSpPr>
+        <p:cNvPr id="1" name=""/>
+        <p:cNvGrpSpPr/>
+        <p:nvPr/>
+      </p:nvGrpSpPr>
+      <p:grpSpPr>
+        <a:xfrm>
+          <a:off x="0" y="0"/>
+          <a:ext cx="0" cy="0"/>
+          <a:chOff x="0" y="0"/>
+          <a:chExt cx="0" cy="0"/>
+        </a:xfrm>
+      </p:grpSpPr>
+      <p:pic>
+        <p:nvPicPr>
+          <p:cNvPr id="5" name="Marcador de contenido 4">
+            <a:extLst>
+              <a:ext uri="{FF2B5EF4-FFF2-40B4-BE49-F238E27FC236}">
+                <a16:creationId xmlns:a16="http://schemas.microsoft.com/office/drawing/2014/main" id="{AA7DECE8-D649-4FA2-BF32-583EB5337310}"/>
+              </a:ext>
+            </a:extLst>
+          </p:cNvPr>
+          <p:cNvPicPr>
+            <a:picLocks noGrp="1" noChangeAspect="1"/>
+          </p:cNvPicPr>
+          <p:nvPr>
+            <p:ph idx="1"/>
+          </p:nvPr>
+        </p:nvPicPr>
+        <p:blipFill rotWithShape="1">
+          <a:blip r:embed="rId2">
+            <a:extLst>
+              <a:ext uri="{28A0092B-C50C-407E-A947-70E740481C1C}">
+                <a14:useLocalDpi xmlns:a14="http://schemas.microsoft.com/office/drawing/2010/main" val="0"/>
+              </a:ext>
+            </a:extLst>
+          </a:blip>
+          <a:srcRect b="15414"/>
+          <a:stretch/>
+        </p:blipFill>
+        <p:spPr>
+          <a:xfrm>
+            <a:off x="20" y="10"/>
+            <a:ext cx="12191980" cy="6857990"/>
+          </a:xfrm>
+          <a:prstGeom prst="rect">
+            <a:avLst/>
+          </a:prstGeom>
+        </p:spPr>
+      </p:pic>
+    </p:spTree>
+    <p:extLst>
+      <p:ext uri="{BB962C8B-B14F-4D97-AF65-F5344CB8AC3E}">
+        <p14:creationId xmlns:p14="http://schemas.microsoft.com/office/powerpoint/2010/main" val="1303194250"/>
+      </p:ext>
+    </p:extLst>
+  </p:cSld>
+  <p:clrMapOvr>
+    <a:masterClrMapping/>
+  </p:clrMapOvr>
+  <mc:AlternateContent xmlns:mc="http://schemas.openxmlformats.org/markup-compatibility/2006" xmlns:p14="http://schemas.microsoft.com/office/powerpoint/2010/main">
+    <mc:Choice Requires="p14">
+      <p:transition spd="slow" p14:dur="2000" advTm="20000"/>
+    </mc:Choice>
+    <mc:Fallback xmlns="">
+      <p:transition spd="slow" advTm="20000"/>
+    </mc:Fallback>
+  </mc:AlternateContent>
 </p:sld>
 </file>
 
@@ -10317,6 +10523,14 @@
   <p:clrMapOvr>
     <a:masterClrMapping/>
   </p:clrMapOvr>
+  <mc:AlternateContent xmlns:mc="http://schemas.openxmlformats.org/markup-compatibility/2006" xmlns:p14="http://schemas.microsoft.com/office/powerpoint/2010/main">
+    <mc:Choice Requires="p14">
+      <p:transition spd="slow" p14:dur="2000" advTm="20000"/>
+    </mc:Choice>
+    <mc:Fallback xmlns="">
+      <p:transition spd="slow" advTm="20000"/>
+    </mc:Fallback>
+  </mc:AlternateContent>
 </p:sld>
 </file>
 
@@ -10415,6 +10629,14 @@
   <p:clrMapOvr>
     <a:masterClrMapping/>
   </p:clrMapOvr>
+  <mc:AlternateContent xmlns:mc="http://schemas.openxmlformats.org/markup-compatibility/2006" xmlns:p14="http://schemas.microsoft.com/office/powerpoint/2010/main">
+    <mc:Choice Requires="p14">
+      <p:transition spd="slow" p14:dur="2000" advTm="20000"/>
+    </mc:Choice>
+    <mc:Fallback xmlns="">
+      <p:transition spd="slow" advTm="20000"/>
+    </mc:Fallback>
+  </mc:AlternateContent>
 </p:sld>
 </file>
 
@@ -10508,7 +10730,7 @@
             </a:r>
             <a:r>
               <a:rPr lang="es-ES" dirty="0"/>
-              <a:t> con </a:t>
+              <a:t> de asignación de código con </a:t>
             </a:r>
             <a:r>
               <a:rPr lang="es-ES" dirty="0" err="1"/>
@@ -10531,6 +10753,14 @@
   <p:clrMapOvr>
     <a:masterClrMapping/>
   </p:clrMapOvr>
+  <mc:AlternateContent xmlns:mc="http://schemas.openxmlformats.org/markup-compatibility/2006" xmlns:p14="http://schemas.microsoft.com/office/powerpoint/2010/main">
+    <mc:Choice Requires="p14">
+      <p:transition spd="slow" p14:dur="2000" advTm="20000"/>
+    </mc:Choice>
+    <mc:Fallback xmlns="">
+      <p:transition spd="slow" advTm="20000"/>
+    </mc:Fallback>
+  </mc:AlternateContent>
 </p:sld>
 </file>
 
@@ -10639,16 +10869,8 @@
           <a:p>
             <a:pPr lvl="2"/>
             <a:r>
-              <a:rPr lang="es-ES" sz="2000" dirty="0"/>
-              <a:t>Ejemplo: Como podemos incidencias con otros grupos </a:t>
-            </a:r>
-            <a:r>
-              <a:rPr lang="es-ES" sz="2000" dirty="0" err="1"/>
-              <a:t>podriamos</a:t>
-            </a:r>
-            <a:r>
-              <a:rPr lang="es-ES" sz="2000" dirty="0"/>
-              <a:t> crear "</a:t>
+              <a:rPr lang="es-ES" dirty="0"/>
+              <a:t>Ejemplo: Como podemos tener incidencias con otros grupos podríamos crear "</a:t>
             </a:r>
             <a:r>
               <a:rPr lang="es-ES" sz="2000" dirty="0" err="1"/>
@@ -10702,8 +10924,29 @@
             </a:r>
             <a:r>
               <a:rPr lang="es-ES" sz="2000" dirty="0"/>
-              <a:t> : display`</a:t>
-            </a:r>
+              <a:t> : display</a:t>
+            </a:r>
+            <a:r>
+              <a:rPr lang="es-ES" dirty="0"/>
+              <a:t>` `</a:t>
+            </a:r>
+            <a:r>
+              <a:rPr lang="es-ES" dirty="0" err="1"/>
+              <a:t>Group</a:t>
+            </a:r>
+            <a:r>
+              <a:rPr lang="es-ES" dirty="0"/>
+              <a:t> : </a:t>
+            </a:r>
+            <a:r>
+              <a:rPr lang="es-ES" dirty="0" err="1"/>
+              <a:t>count</a:t>
+            </a:r>
+            <a:r>
+              <a:rPr lang="es-ES" dirty="0"/>
+              <a:t>`</a:t>
+            </a:r>
+            <a:endParaRPr lang="es-ES" sz="2000" dirty="0"/>
           </a:p>
         </p:txBody>
       </p:sp>
@@ -10717,6 +10960,14 @@
   <p:clrMapOvr>
     <a:masterClrMapping/>
   </p:clrMapOvr>
+  <mc:AlternateContent xmlns:mc="http://schemas.openxmlformats.org/markup-compatibility/2006" xmlns:p14="http://schemas.microsoft.com/office/powerpoint/2010/main">
+    <mc:Choice Requires="p14">
+      <p:transition spd="slow" p14:dur="2000" advTm="20000"/>
+    </mc:Choice>
+    <mc:Fallback xmlns="">
+      <p:transition spd="slow" advTm="20000"/>
+    </mc:Fallback>
+  </mc:AlternateContent>
 </p:sld>
 </file>
 
@@ -10907,6 +11158,14 @@
   <p:clrMapOvr>
     <a:masterClrMapping/>
   </p:clrMapOvr>
+  <mc:AlternateContent xmlns:mc="http://schemas.openxmlformats.org/markup-compatibility/2006" xmlns:p14="http://schemas.microsoft.com/office/powerpoint/2010/main">
+    <mc:Choice Requires="p14">
+      <p:transition spd="slow" p14:dur="2000" advTm="20000"/>
+    </mc:Choice>
+    <mc:Fallback xmlns="">
+      <p:transition spd="slow" advTm="20000"/>
+    </mc:Fallback>
+  </mc:AlternateContent>
 </p:sld>
 </file>
 
@@ -11037,6 +11296,14 @@
   <p:clrMapOvr>
     <a:masterClrMapping/>
   </p:clrMapOvr>
+  <mc:AlternateContent xmlns:mc="http://schemas.openxmlformats.org/markup-compatibility/2006" xmlns:p14="http://schemas.microsoft.com/office/powerpoint/2010/main">
+    <mc:Choice Requires="p14">
+      <p:transition spd="slow" p14:dur="2000" advTm="20000"/>
+    </mc:Choice>
+    <mc:Fallback xmlns="">
+      <p:transition spd="slow" advTm="20000"/>
+    </mc:Fallback>
+  </mc:AlternateContent>
 </p:sld>
 </file>
 
@@ -11281,6 +11548,14 @@
   <p:clrMapOvr>
     <a:masterClrMapping/>
   </p:clrMapOvr>
+  <mc:AlternateContent xmlns:mc="http://schemas.openxmlformats.org/markup-compatibility/2006" xmlns:p14="http://schemas.microsoft.com/office/powerpoint/2010/main">
+    <mc:Choice Requires="p14">
+      <p:transition spd="slow" p14:dur="2000" advTm="20000"/>
+    </mc:Choice>
+    <mc:Fallback xmlns="">
+      <p:transition spd="slow" advTm="20000"/>
+    </mc:Fallback>
+  </mc:AlternateContent>
 </p:sld>
 </file>
 

</xml_diff>